<commit_message>
updating first 3 weeks
</commit_message>
<xml_diff>
--- a/Week_1/Lectures/Lecture_2_Slides.pptx
+++ b/Week_1/Lectures/Lecture_2_Slides.pptx
@@ -6,16 +6,21 @@
   </p:sldMasterIdLst>
   <p:sldIdLst>
     <p:sldId id="256" r:id="rId2"/>
-    <p:sldId id="257" r:id="rId3"/>
-    <p:sldId id="258" r:id="rId4"/>
-    <p:sldId id="259" r:id="rId5"/>
-    <p:sldId id="260" r:id="rId6"/>
-    <p:sldId id="262" r:id="rId7"/>
-    <p:sldId id="263" r:id="rId8"/>
-    <p:sldId id="264" r:id="rId9"/>
-    <p:sldId id="265" r:id="rId10"/>
-    <p:sldId id="266" r:id="rId11"/>
-    <p:sldId id="261" r:id="rId12"/>
+    <p:sldId id="267" r:id="rId3"/>
+    <p:sldId id="268" r:id="rId4"/>
+    <p:sldId id="270" r:id="rId5"/>
+    <p:sldId id="271" r:id="rId6"/>
+    <p:sldId id="269" r:id="rId7"/>
+    <p:sldId id="257" r:id="rId8"/>
+    <p:sldId id="258" r:id="rId9"/>
+    <p:sldId id="259" r:id="rId10"/>
+    <p:sldId id="260" r:id="rId11"/>
+    <p:sldId id="262" r:id="rId12"/>
+    <p:sldId id="263" r:id="rId13"/>
+    <p:sldId id="264" r:id="rId14"/>
+    <p:sldId id="265" r:id="rId15"/>
+    <p:sldId id="266" r:id="rId16"/>
+    <p:sldId id="261" r:id="rId17"/>
   </p:sldIdLst>
   <p:sldSz cx="12192000" cy="6858000"/>
   <p:notesSz cx="6858000" cy="9144000"/>
@@ -114,6 +119,11 @@
       </a:defRPr>
     </a:lvl9pPr>
   </p:defaultTextStyle>
+  <p:extLst>
+    <p:ext uri="{EFAFB233-063F-42B5-8137-9DF3F51BA10A}">
+      <p15:sldGuideLst xmlns:p15="http://schemas.microsoft.com/office/powerpoint/2012/main"/>
+    </p:ext>
+  </p:extLst>
 </p:presentation>
 </file>
 
@@ -248,7 +258,7 @@
           <a:p>
             <a:fld id="{9C1EC067-AA84-4553-AA47-178FC1757A77}" type="datetimeFigureOut">
               <a:rPr lang="en-US" smtClean="0"/>
-              <a:t>12/30/2016</a:t>
+              <a:t>1/1/2017</a:t>
             </a:fld>
             <a:endParaRPr lang="en-US"/>
           </a:p>
@@ -418,7 +428,7 @@
           <a:p>
             <a:fld id="{9C1EC067-AA84-4553-AA47-178FC1757A77}" type="datetimeFigureOut">
               <a:rPr lang="en-US" smtClean="0"/>
-              <a:t>12/30/2016</a:t>
+              <a:t>1/1/2017</a:t>
             </a:fld>
             <a:endParaRPr lang="en-US"/>
           </a:p>
@@ -598,7 +608,7 @@
           <a:p>
             <a:fld id="{9C1EC067-AA84-4553-AA47-178FC1757A77}" type="datetimeFigureOut">
               <a:rPr lang="en-US" smtClean="0"/>
-              <a:t>12/30/2016</a:t>
+              <a:t>1/1/2017</a:t>
             </a:fld>
             <a:endParaRPr lang="en-US"/>
           </a:p>
@@ -768,7 +778,7 @@
           <a:p>
             <a:fld id="{9C1EC067-AA84-4553-AA47-178FC1757A77}" type="datetimeFigureOut">
               <a:rPr lang="en-US" smtClean="0"/>
-              <a:t>12/30/2016</a:t>
+              <a:t>1/1/2017</a:t>
             </a:fld>
             <a:endParaRPr lang="en-US"/>
           </a:p>
@@ -1014,7 +1024,7 @@
           <a:p>
             <a:fld id="{9C1EC067-AA84-4553-AA47-178FC1757A77}" type="datetimeFigureOut">
               <a:rPr lang="en-US" smtClean="0"/>
-              <a:t>12/30/2016</a:t>
+              <a:t>1/1/2017</a:t>
             </a:fld>
             <a:endParaRPr lang="en-US"/>
           </a:p>
@@ -1246,7 +1256,7 @@
           <a:p>
             <a:fld id="{9C1EC067-AA84-4553-AA47-178FC1757A77}" type="datetimeFigureOut">
               <a:rPr lang="en-US" smtClean="0"/>
-              <a:t>12/30/2016</a:t>
+              <a:t>1/1/2017</a:t>
             </a:fld>
             <a:endParaRPr lang="en-US"/>
           </a:p>
@@ -1613,7 +1623,7 @@
           <a:p>
             <a:fld id="{9C1EC067-AA84-4553-AA47-178FC1757A77}" type="datetimeFigureOut">
               <a:rPr lang="en-US" smtClean="0"/>
-              <a:t>12/30/2016</a:t>
+              <a:t>1/1/2017</a:t>
             </a:fld>
             <a:endParaRPr lang="en-US"/>
           </a:p>
@@ -1731,7 +1741,7 @@
           <a:p>
             <a:fld id="{9C1EC067-AA84-4553-AA47-178FC1757A77}" type="datetimeFigureOut">
               <a:rPr lang="en-US" smtClean="0"/>
-              <a:t>12/30/2016</a:t>
+              <a:t>1/1/2017</a:t>
             </a:fld>
             <a:endParaRPr lang="en-US"/>
           </a:p>
@@ -1826,7 +1836,7 @@
           <a:p>
             <a:fld id="{9C1EC067-AA84-4553-AA47-178FC1757A77}" type="datetimeFigureOut">
               <a:rPr lang="en-US" smtClean="0"/>
-              <a:t>12/30/2016</a:t>
+              <a:t>1/1/2017</a:t>
             </a:fld>
             <a:endParaRPr lang="en-US"/>
           </a:p>
@@ -2103,7 +2113,7 @@
           <a:p>
             <a:fld id="{9C1EC067-AA84-4553-AA47-178FC1757A77}" type="datetimeFigureOut">
               <a:rPr lang="en-US" smtClean="0"/>
-              <a:t>12/30/2016</a:t>
+              <a:t>1/1/2017</a:t>
             </a:fld>
             <a:endParaRPr lang="en-US"/>
           </a:p>
@@ -2356,7 +2366,7 @@
           <a:p>
             <a:fld id="{9C1EC067-AA84-4553-AA47-178FC1757A77}" type="datetimeFigureOut">
               <a:rPr lang="en-US" smtClean="0"/>
-              <a:t>12/30/2016</a:t>
+              <a:t>1/1/2017</a:t>
             </a:fld>
             <a:endParaRPr lang="en-US"/>
           </a:p>
@@ -2569,7 +2579,7 @@
           <a:p>
             <a:fld id="{9C1EC067-AA84-4553-AA47-178FC1757A77}" type="datetimeFigureOut">
               <a:rPr lang="en-US" smtClean="0"/>
-              <a:t>12/30/2016</a:t>
+              <a:t>1/1/2017</a:t>
             </a:fld>
             <a:endParaRPr lang="en-US"/>
           </a:p>
@@ -3067,7 +3077,206 @@
           <a:p>
             <a:r>
               <a:rPr lang="en-US" dirty="0" smtClean="0"/>
-              <a:t>GitHub</a:t>
+              <a:t>Others</a:t>
+            </a:r>
+            <a:endParaRPr lang="en-US" dirty="0"/>
+          </a:p>
+        </p:txBody>
+      </p:sp>
+      <p:sp>
+        <p:nvSpPr>
+          <p:cNvPr id="3" name="Content Placeholder 2"/>
+          <p:cNvSpPr>
+            <a:spLocks noGrp="1"/>
+          </p:cNvSpPr>
+          <p:nvPr>
+            <p:ph idx="1"/>
+          </p:nvPr>
+        </p:nvSpPr>
+        <p:spPr/>
+        <p:txBody>
+          <a:bodyPr/>
+          <a:lstStyle/>
+          <a:p>
+            <a:r>
+              <a:rPr lang="en-US" dirty="0" err="1" smtClean="0"/>
+              <a:t>PyCharm</a:t>
+            </a:r>
+            <a:endParaRPr lang="en-US" dirty="0" smtClean="0"/>
+          </a:p>
+          <a:p>
+            <a:r>
+              <a:rPr lang="en-US" dirty="0" smtClean="0"/>
+              <a:t>Eclipse</a:t>
+            </a:r>
+          </a:p>
+          <a:p>
+            <a:r>
+              <a:rPr lang="en-US" dirty="0" smtClean="0"/>
+              <a:t>Visual Studio</a:t>
+            </a:r>
+          </a:p>
+          <a:p>
+            <a:r>
+              <a:rPr lang="en-US" dirty="0" smtClean="0"/>
+              <a:t>Wing IDE</a:t>
+            </a:r>
+          </a:p>
+          <a:p>
+            <a:r>
+              <a:rPr lang="en-US" dirty="0" err="1" smtClean="0"/>
+              <a:t>Spyder</a:t>
+            </a:r>
+            <a:endParaRPr lang="en-US" dirty="0" smtClean="0"/>
+          </a:p>
+          <a:p>
+            <a:r>
+              <a:rPr lang="en-US" dirty="0" smtClean="0"/>
+              <a:t>Top 10 Python IDEs: </a:t>
+            </a:r>
+            <a:r>
+              <a:rPr lang="en-US" dirty="0" smtClean="0">
+                <a:hlinkClick r:id="rId2"/>
+              </a:rPr>
+              <a:t>http://noeticforce.com/best-python-ide-for-programmers-windows-and-mac</a:t>
+            </a:r>
+            <a:endParaRPr lang="en-US" dirty="0" smtClean="0"/>
+          </a:p>
+          <a:p>
+            <a:endParaRPr lang="en-US" dirty="0" smtClean="0"/>
+          </a:p>
+          <a:p>
+            <a:endParaRPr lang="en-US" dirty="0"/>
+          </a:p>
+        </p:txBody>
+      </p:sp>
+    </p:spTree>
+    <p:extLst>
+      <p:ext uri="{BB962C8B-B14F-4D97-AF65-F5344CB8AC3E}">
+        <p14:creationId xmlns:p14="http://schemas.microsoft.com/office/powerpoint/2010/main" val="3113246402"/>
+      </p:ext>
+    </p:extLst>
+  </p:cSld>
+  <p:clrMapOvr>
+    <a:masterClrMapping/>
+  </p:clrMapOvr>
+</p:sld>
+</file>
+
+<file path=ppt/slides/slide11.xml><?xml version="1.0" encoding="utf-8"?>
+<p:sld xmlns:a="http://schemas.openxmlformats.org/drawingml/2006/main" xmlns:r="http://schemas.openxmlformats.org/officeDocument/2006/relationships" xmlns:p="http://schemas.openxmlformats.org/presentationml/2006/main">
+  <p:cSld>
+    <p:spTree>
+      <p:nvGrpSpPr>
+        <p:cNvPr id="1" name=""/>
+        <p:cNvGrpSpPr/>
+        <p:nvPr/>
+      </p:nvGrpSpPr>
+      <p:grpSpPr>
+        <a:xfrm>
+          <a:off x="0" y="0"/>
+          <a:ext cx="0" cy="0"/>
+          <a:chOff x="0" y="0"/>
+          <a:chExt cx="0" cy="0"/>
+        </a:xfrm>
+      </p:grpSpPr>
+      <p:sp>
+        <p:nvSpPr>
+          <p:cNvPr id="4" name="Title 3"/>
+          <p:cNvSpPr>
+            <a:spLocks noGrp="1"/>
+          </p:cNvSpPr>
+          <p:nvPr>
+            <p:ph type="title"/>
+          </p:nvPr>
+        </p:nvSpPr>
+        <p:spPr/>
+        <p:txBody>
+          <a:bodyPr/>
+          <a:lstStyle/>
+          <a:p>
+            <a:r>
+              <a:rPr lang="en-US" dirty="0" smtClean="0"/>
+              <a:t>Getting Help</a:t>
+            </a:r>
+            <a:endParaRPr lang="en-US" dirty="0"/>
+          </a:p>
+        </p:txBody>
+      </p:sp>
+      <p:sp>
+        <p:nvSpPr>
+          <p:cNvPr id="5" name="Text Placeholder 4"/>
+          <p:cNvSpPr>
+            <a:spLocks noGrp="1"/>
+          </p:cNvSpPr>
+          <p:nvPr>
+            <p:ph type="body" idx="1"/>
+          </p:nvPr>
+        </p:nvSpPr>
+        <p:spPr/>
+        <p:txBody>
+          <a:bodyPr/>
+          <a:lstStyle/>
+          <a:p>
+            <a:endParaRPr lang="en-US"/>
+          </a:p>
+        </p:txBody>
+      </p:sp>
+    </p:spTree>
+    <p:extLst>
+      <p:ext uri="{BB962C8B-B14F-4D97-AF65-F5344CB8AC3E}">
+        <p14:creationId xmlns:p14="http://schemas.microsoft.com/office/powerpoint/2010/main" val="4216389736"/>
+      </p:ext>
+    </p:extLst>
+  </p:cSld>
+  <p:clrMapOvr>
+    <a:masterClrMapping/>
+  </p:clrMapOvr>
+  <p:timing>
+    <p:tnLst>
+      <p:par>
+        <p:cTn id="1" dur="indefinite" restart="never" nodeType="tmRoot"/>
+      </p:par>
+    </p:tnLst>
+  </p:timing>
+</p:sld>
+</file>
+
+<file path=ppt/slides/slide12.xml><?xml version="1.0" encoding="utf-8"?>
+<p:sld xmlns:a="http://schemas.openxmlformats.org/drawingml/2006/main" xmlns:r="http://schemas.openxmlformats.org/officeDocument/2006/relationships" xmlns:p="http://schemas.openxmlformats.org/presentationml/2006/main">
+  <p:cSld>
+    <p:spTree>
+      <p:nvGrpSpPr>
+        <p:cNvPr id="1" name=""/>
+        <p:cNvGrpSpPr/>
+        <p:nvPr/>
+      </p:nvGrpSpPr>
+      <p:grpSpPr>
+        <a:xfrm>
+          <a:off x="0" y="0"/>
+          <a:ext cx="0" cy="0"/>
+          <a:chOff x="0" y="0"/>
+          <a:chExt cx="0" cy="0"/>
+        </a:xfrm>
+      </p:grpSpPr>
+      <p:sp>
+        <p:nvSpPr>
+          <p:cNvPr id="4" name="Title 3"/>
+          <p:cNvSpPr>
+            <a:spLocks noGrp="1"/>
+          </p:cNvSpPr>
+          <p:nvPr>
+            <p:ph type="title"/>
+          </p:nvPr>
+        </p:nvSpPr>
+        <p:spPr/>
+        <p:txBody>
+          <a:bodyPr/>
+          <a:lstStyle/>
+          <a:p>
+            <a:r>
+              <a:rPr lang="en-US" dirty="0" smtClean="0"/>
+              <a:t>Arcgis.com</a:t>
             </a:r>
             <a:endParaRPr lang="en-US" dirty="0"/>
           </a:p>
@@ -3075,7 +3284,211 @@
       </p:sp>
       <p:pic>
         <p:nvPicPr>
-          <p:cNvPr id="3" name="Picture 2"/>
+          <p:cNvPr id="6" name="Picture 5"/>
+          <p:cNvPicPr>
+            <a:picLocks noChangeAspect="1"/>
+          </p:cNvPicPr>
+          <p:nvPr/>
+        </p:nvPicPr>
+        <p:blipFill rotWithShape="1">
+          <a:blip r:embed="rId2"/>
+          <a:srcRect l="34734" t="3165" r="22565"/>
+          <a:stretch/>
+        </p:blipFill>
+        <p:spPr>
+          <a:xfrm>
+            <a:off x="3402869" y="1208316"/>
+            <a:ext cx="6386109" cy="8146286"/>
+          </a:xfrm>
+          <a:prstGeom prst="rect">
+            <a:avLst/>
+          </a:prstGeom>
+        </p:spPr>
+      </p:pic>
+    </p:spTree>
+    <p:extLst>
+      <p:ext uri="{BB962C8B-B14F-4D97-AF65-F5344CB8AC3E}">
+        <p14:creationId xmlns:p14="http://schemas.microsoft.com/office/powerpoint/2010/main" val="3140651273"/>
+      </p:ext>
+    </p:extLst>
+  </p:cSld>
+  <p:clrMapOvr>
+    <a:masterClrMapping/>
+  </p:clrMapOvr>
+  <p:timing>
+    <p:tnLst>
+      <p:par>
+        <p:cTn id="1" dur="indefinite" restart="never" nodeType="tmRoot"/>
+      </p:par>
+    </p:tnLst>
+  </p:timing>
+</p:sld>
+</file>
+
+<file path=ppt/slides/slide13.xml><?xml version="1.0" encoding="utf-8"?>
+<p:sld xmlns:a="http://schemas.openxmlformats.org/drawingml/2006/main" xmlns:r="http://schemas.openxmlformats.org/officeDocument/2006/relationships" xmlns:p="http://schemas.openxmlformats.org/presentationml/2006/main">
+  <p:cSld>
+    <p:spTree>
+      <p:nvGrpSpPr>
+        <p:cNvPr id="1" name=""/>
+        <p:cNvGrpSpPr/>
+        <p:nvPr/>
+      </p:nvGrpSpPr>
+      <p:grpSpPr>
+        <a:xfrm>
+          <a:off x="0" y="0"/>
+          <a:ext cx="0" cy="0"/>
+          <a:chOff x="0" y="0"/>
+          <a:chExt cx="0" cy="0"/>
+        </a:xfrm>
+      </p:grpSpPr>
+      <p:sp>
+        <p:nvSpPr>
+          <p:cNvPr id="2" name="Title 1"/>
+          <p:cNvSpPr>
+            <a:spLocks noGrp="1"/>
+          </p:cNvSpPr>
+          <p:nvPr>
+            <p:ph type="title"/>
+          </p:nvPr>
+        </p:nvSpPr>
+        <p:spPr/>
+        <p:txBody>
+          <a:bodyPr/>
+          <a:lstStyle/>
+          <a:p>
+            <a:r>
+              <a:rPr lang="en-US" dirty="0" smtClean="0"/>
+              <a:t>Google!</a:t>
+            </a:r>
+            <a:endParaRPr lang="en-US" dirty="0"/>
+          </a:p>
+        </p:txBody>
+      </p:sp>
+      <p:sp>
+        <p:nvSpPr>
+          <p:cNvPr id="4" name="Content Placeholder 3"/>
+          <p:cNvSpPr>
+            <a:spLocks noGrp="1"/>
+          </p:cNvSpPr>
+          <p:nvPr>
+            <p:ph idx="1"/>
+          </p:nvPr>
+        </p:nvSpPr>
+        <p:spPr>
+          <a:xfrm>
+            <a:off x="987829" y="1393363"/>
+            <a:ext cx="10515600" cy="4351338"/>
+          </a:xfrm>
+        </p:spPr>
+        <p:txBody>
+          <a:bodyPr/>
+          <a:lstStyle/>
+          <a:p>
+            <a:r>
+              <a:rPr lang="en-US" dirty="0" smtClean="0"/>
+              <a:t>For example, </a:t>
+            </a:r>
+            <a:r>
+              <a:rPr lang="en-US" dirty="0" smtClean="0">
+                <a:hlinkClick r:id="rId2"/>
+              </a:rPr>
+              <a:t>Google</a:t>
+            </a:r>
+            <a:r>
+              <a:rPr lang="en-US" dirty="0" smtClean="0"/>
+              <a:t> “Python dictionary”</a:t>
+            </a:r>
+            <a:endParaRPr lang="en-US" dirty="0"/>
+          </a:p>
+        </p:txBody>
+      </p:sp>
+      <p:pic>
+        <p:nvPicPr>
+          <p:cNvPr id="5" name="Picture 4"/>
+          <p:cNvPicPr>
+            <a:picLocks noChangeAspect="1"/>
+          </p:cNvPicPr>
+          <p:nvPr/>
+        </p:nvPicPr>
+        <p:blipFill rotWithShape="1">
+          <a:blip r:embed="rId3"/>
+          <a:srcRect t="3059" r="47489"/>
+          <a:stretch/>
+        </p:blipFill>
+        <p:spPr>
+          <a:xfrm>
+            <a:off x="2362942" y="2027242"/>
+            <a:ext cx="7765373" cy="8063815"/>
+          </a:xfrm>
+          <a:prstGeom prst="rect">
+            <a:avLst/>
+          </a:prstGeom>
+        </p:spPr>
+      </p:pic>
+    </p:spTree>
+    <p:extLst>
+      <p:ext uri="{BB962C8B-B14F-4D97-AF65-F5344CB8AC3E}">
+        <p14:creationId xmlns:p14="http://schemas.microsoft.com/office/powerpoint/2010/main" val="547555302"/>
+      </p:ext>
+    </p:extLst>
+  </p:cSld>
+  <p:clrMapOvr>
+    <a:masterClrMapping/>
+  </p:clrMapOvr>
+  <p:timing>
+    <p:tnLst>
+      <p:par>
+        <p:cTn id="1" dur="indefinite" restart="never" nodeType="tmRoot"/>
+      </p:par>
+    </p:tnLst>
+  </p:timing>
+</p:sld>
+</file>
+
+<file path=ppt/slides/slide14.xml><?xml version="1.0" encoding="utf-8"?>
+<p:sld xmlns:a="http://schemas.openxmlformats.org/drawingml/2006/main" xmlns:r="http://schemas.openxmlformats.org/officeDocument/2006/relationships" xmlns:p="http://schemas.openxmlformats.org/presentationml/2006/main">
+  <p:cSld>
+    <p:spTree>
+      <p:nvGrpSpPr>
+        <p:cNvPr id="1" name=""/>
+        <p:cNvGrpSpPr/>
+        <p:nvPr/>
+      </p:nvGrpSpPr>
+      <p:grpSpPr>
+        <a:xfrm>
+          <a:off x="0" y="0"/>
+          <a:ext cx="0" cy="0"/>
+          <a:chOff x="0" y="0"/>
+          <a:chExt cx="0" cy="0"/>
+        </a:xfrm>
+      </p:grpSpPr>
+      <p:sp>
+        <p:nvSpPr>
+          <p:cNvPr id="2" name="Title 1"/>
+          <p:cNvSpPr>
+            <a:spLocks noGrp="1"/>
+          </p:cNvSpPr>
+          <p:nvPr>
+            <p:ph type="title"/>
+          </p:nvPr>
+        </p:nvSpPr>
+        <p:spPr/>
+        <p:txBody>
+          <a:bodyPr/>
+          <a:lstStyle/>
+          <a:p>
+            <a:r>
+              <a:rPr lang="en-US" dirty="0" smtClean="0"/>
+              <a:t>Stack Overflow</a:t>
+            </a:r>
+            <a:endParaRPr lang="en-US" dirty="0"/>
+          </a:p>
+        </p:txBody>
+      </p:sp>
+      <p:pic>
+        <p:nvPicPr>
+          <p:cNvPr id="4" name="Picture 3"/>
           <p:cNvPicPr>
             <a:picLocks noChangeAspect="1"/>
           </p:cNvPicPr>
@@ -3089,8 +3502,84 @@
         </p:blipFill>
         <p:spPr>
           <a:xfrm>
-            <a:off x="1364894" y="1412420"/>
-            <a:ext cx="9462211" cy="5322494"/>
+            <a:off x="773939" y="1396092"/>
+            <a:ext cx="10644122" cy="5987319"/>
+          </a:xfrm>
+          <a:prstGeom prst="rect">
+            <a:avLst/>
+          </a:prstGeom>
+        </p:spPr>
+      </p:pic>
+    </p:spTree>
+    <p:extLst>
+      <p:ext uri="{BB962C8B-B14F-4D97-AF65-F5344CB8AC3E}">
+        <p14:creationId xmlns:p14="http://schemas.microsoft.com/office/powerpoint/2010/main" val="2081193750"/>
+      </p:ext>
+    </p:extLst>
+  </p:cSld>
+  <p:clrMapOvr>
+    <a:masterClrMapping/>
+  </p:clrMapOvr>
+</p:sld>
+</file>
+
+<file path=ppt/slides/slide15.xml><?xml version="1.0" encoding="utf-8"?>
+<p:sld xmlns:a="http://schemas.openxmlformats.org/drawingml/2006/main" xmlns:r="http://schemas.openxmlformats.org/officeDocument/2006/relationships" xmlns:p="http://schemas.openxmlformats.org/presentationml/2006/main">
+  <p:cSld>
+    <p:spTree>
+      <p:nvGrpSpPr>
+        <p:cNvPr id="1" name=""/>
+        <p:cNvGrpSpPr/>
+        <p:nvPr/>
+      </p:nvGrpSpPr>
+      <p:grpSpPr>
+        <a:xfrm>
+          <a:off x="0" y="0"/>
+          <a:ext cx="0" cy="0"/>
+          <a:chOff x="0" y="0"/>
+          <a:chExt cx="0" cy="0"/>
+        </a:xfrm>
+      </p:grpSpPr>
+      <p:sp>
+        <p:nvSpPr>
+          <p:cNvPr id="2" name="Title 1"/>
+          <p:cNvSpPr>
+            <a:spLocks noGrp="1"/>
+          </p:cNvSpPr>
+          <p:nvPr>
+            <p:ph type="title"/>
+          </p:nvPr>
+        </p:nvSpPr>
+        <p:spPr/>
+        <p:txBody>
+          <a:bodyPr/>
+          <a:lstStyle/>
+          <a:p>
+            <a:r>
+              <a:rPr lang="en-US" dirty="0" smtClean="0"/>
+              <a:t>GitHub</a:t>
+            </a:r>
+            <a:endParaRPr lang="en-US" dirty="0"/>
+          </a:p>
+        </p:txBody>
+      </p:sp>
+      <p:pic>
+        <p:nvPicPr>
+          <p:cNvPr id="3" name="Picture 2"/>
+          <p:cNvPicPr>
+            <a:picLocks noChangeAspect="1"/>
+          </p:cNvPicPr>
+          <p:nvPr/>
+        </p:nvPicPr>
+        <p:blipFill rotWithShape="1">
+          <a:blip r:embed="rId2"/>
+          <a:srcRect l="22961" r="23917"/>
+          <a:stretch/>
+        </p:blipFill>
+        <p:spPr>
+          <a:xfrm>
+            <a:off x="2809702" y="1381190"/>
+            <a:ext cx="6500553" cy="6883266"/>
           </a:xfrm>
           <a:prstGeom prst="rect">
             <a:avLst/>
@@ -3110,7 +3599,7 @@
 </p:sld>
 </file>
 
-<file path=ppt/slides/slide11.xml><?xml version="1.0" encoding="utf-8"?>
+<file path=ppt/slides/slide16.xml><?xml version="1.0" encoding="utf-8"?>
 <p:sld xmlns:a="http://schemas.openxmlformats.org/drawingml/2006/main" xmlns:r="http://schemas.openxmlformats.org/officeDocument/2006/relationships" xmlns:p="http://schemas.openxmlformats.org/presentationml/2006/main">
   <p:cSld>
     <p:spTree>
@@ -3216,6 +3705,624 @@
           <a:p>
             <a:r>
               <a:rPr lang="en-US" dirty="0" smtClean="0"/>
+              <a:t>Python</a:t>
+            </a:r>
+            <a:endParaRPr lang="en-US" dirty="0"/>
+          </a:p>
+        </p:txBody>
+      </p:sp>
+      <p:sp>
+        <p:nvSpPr>
+          <p:cNvPr id="3" name="Content Placeholder 2"/>
+          <p:cNvSpPr>
+            <a:spLocks noGrp="1"/>
+          </p:cNvSpPr>
+          <p:nvPr>
+            <p:ph idx="1"/>
+          </p:nvPr>
+        </p:nvSpPr>
+        <p:spPr>
+          <a:xfrm>
+            <a:off x="838200" y="1825625"/>
+            <a:ext cx="5262573" cy="4351338"/>
+          </a:xfrm>
+        </p:spPr>
+        <p:txBody>
+          <a:bodyPr>
+            <a:normAutofit lnSpcReduction="10000"/>
+          </a:bodyPr>
+          <a:lstStyle/>
+          <a:p>
+            <a:r>
+              <a:rPr lang="en-US" dirty="0" smtClean="0"/>
+              <a:t>Created in 1989 by Guido van Rossum</a:t>
+            </a:r>
+          </a:p>
+          <a:p>
+            <a:endParaRPr lang="en-US" dirty="0"/>
+          </a:p>
+          <a:p>
+            <a:r>
+              <a:rPr lang="en-US" dirty="0" smtClean="0"/>
+              <a:t>Named after </a:t>
+            </a:r>
+            <a:r>
+              <a:rPr lang="en-US" i="1" dirty="0" smtClean="0"/>
+              <a:t>Monty Python</a:t>
+            </a:r>
+          </a:p>
+          <a:p>
+            <a:endParaRPr lang="en-US" i="1" dirty="0"/>
+          </a:p>
+          <a:p>
+            <a:r>
+              <a:rPr lang="en-US" dirty="0" smtClean="0"/>
+              <a:t>Evolved into a major programming language</a:t>
+            </a:r>
+          </a:p>
+          <a:p>
+            <a:endParaRPr lang="en-US" dirty="0"/>
+          </a:p>
+          <a:p>
+            <a:r>
+              <a:rPr lang="en-US" dirty="0">
+                <a:hlinkClick r:id="rId2"/>
+              </a:rPr>
+              <a:t>http://www.tiobe.com/tiobe-index</a:t>
+            </a:r>
+            <a:r>
+              <a:rPr lang="en-US" dirty="0" smtClean="0">
+                <a:hlinkClick r:id="rId2"/>
+              </a:rPr>
+              <a:t>/</a:t>
+            </a:r>
+            <a:r>
+              <a:rPr lang="en-US" dirty="0" smtClean="0"/>
+              <a:t> </a:t>
+            </a:r>
+          </a:p>
+        </p:txBody>
+      </p:sp>
+      <p:pic>
+        <p:nvPicPr>
+          <p:cNvPr id="4" name="Picture 3"/>
+          <p:cNvPicPr>
+            <a:picLocks noChangeAspect="1"/>
+          </p:cNvPicPr>
+          <p:nvPr/>
+        </p:nvPicPr>
+        <p:blipFill rotWithShape="1">
+          <a:blip r:embed="rId3"/>
+          <a:srcRect l="18121" t="19656" r="19197" b="404"/>
+          <a:stretch/>
+        </p:blipFill>
+        <p:spPr>
+          <a:xfrm>
+            <a:off x="5589505" y="1027906"/>
+            <a:ext cx="8055986" cy="5779103"/>
+          </a:xfrm>
+          <a:prstGeom prst="rect">
+            <a:avLst/>
+          </a:prstGeom>
+        </p:spPr>
+      </p:pic>
+    </p:spTree>
+    <p:extLst>
+      <p:ext uri="{BB962C8B-B14F-4D97-AF65-F5344CB8AC3E}">
+        <p14:creationId xmlns:p14="http://schemas.microsoft.com/office/powerpoint/2010/main" val="3874206187"/>
+      </p:ext>
+    </p:extLst>
+  </p:cSld>
+  <p:clrMapOvr>
+    <a:masterClrMapping/>
+  </p:clrMapOvr>
+</p:sld>
+</file>
+
+<file path=ppt/slides/slide3.xml><?xml version="1.0" encoding="utf-8"?>
+<p:sld xmlns:a="http://schemas.openxmlformats.org/drawingml/2006/main" xmlns:r="http://schemas.openxmlformats.org/officeDocument/2006/relationships" xmlns:p="http://schemas.openxmlformats.org/presentationml/2006/main">
+  <p:cSld>
+    <p:spTree>
+      <p:nvGrpSpPr>
+        <p:cNvPr id="1" name=""/>
+        <p:cNvGrpSpPr/>
+        <p:nvPr/>
+      </p:nvGrpSpPr>
+      <p:grpSpPr>
+        <a:xfrm>
+          <a:off x="0" y="0"/>
+          <a:ext cx="0" cy="0"/>
+          <a:chOff x="0" y="0"/>
+          <a:chExt cx="0" cy="0"/>
+        </a:xfrm>
+      </p:grpSpPr>
+      <p:sp>
+        <p:nvSpPr>
+          <p:cNvPr id="2" name="Title 1"/>
+          <p:cNvSpPr>
+            <a:spLocks noGrp="1"/>
+          </p:cNvSpPr>
+          <p:nvPr>
+            <p:ph type="title"/>
+          </p:nvPr>
+        </p:nvSpPr>
+        <p:spPr/>
+        <p:txBody>
+          <a:bodyPr/>
+          <a:lstStyle/>
+          <a:p>
+            <a:r>
+              <a:rPr lang="en-US" dirty="0" smtClean="0"/>
+              <a:t>Advantages to Python</a:t>
+            </a:r>
+            <a:endParaRPr lang="en-US" dirty="0"/>
+          </a:p>
+        </p:txBody>
+      </p:sp>
+      <p:sp>
+        <p:nvSpPr>
+          <p:cNvPr id="3" name="Content Placeholder 2"/>
+          <p:cNvSpPr>
+            <a:spLocks noGrp="1"/>
+          </p:cNvSpPr>
+          <p:nvPr>
+            <p:ph idx="1"/>
+          </p:nvPr>
+        </p:nvSpPr>
+        <p:spPr/>
+        <p:txBody>
+          <a:bodyPr/>
+          <a:lstStyle/>
+          <a:p>
+            <a:r>
+              <a:rPr lang="en-US" dirty="0" smtClean="0"/>
+              <a:t>Simple syntax: easy to read and write</a:t>
+            </a:r>
+            <a:endParaRPr lang="en-US" dirty="0"/>
+          </a:p>
+          <a:p>
+            <a:endParaRPr lang="en-US" dirty="0" smtClean="0"/>
+          </a:p>
+          <a:p>
+            <a:r>
+              <a:rPr lang="en-US" dirty="0" smtClean="0"/>
+              <a:t>Allows for rapid testing and development</a:t>
+            </a:r>
+          </a:p>
+          <a:p>
+            <a:endParaRPr lang="en-US" dirty="0"/>
+          </a:p>
+          <a:p>
+            <a:r>
+              <a:rPr lang="en-US" dirty="0" smtClean="0"/>
+              <a:t>Open Source</a:t>
+            </a:r>
+            <a:endParaRPr lang="en-US" dirty="0"/>
+          </a:p>
+        </p:txBody>
+      </p:sp>
+    </p:spTree>
+    <p:extLst>
+      <p:ext uri="{BB962C8B-B14F-4D97-AF65-F5344CB8AC3E}">
+        <p14:creationId xmlns:p14="http://schemas.microsoft.com/office/powerpoint/2010/main" val="4109686786"/>
+      </p:ext>
+    </p:extLst>
+  </p:cSld>
+  <p:clrMapOvr>
+    <a:masterClrMapping/>
+  </p:clrMapOvr>
+</p:sld>
+</file>
+
+<file path=ppt/slides/slide4.xml><?xml version="1.0" encoding="utf-8"?>
+<p:sld xmlns:a="http://schemas.openxmlformats.org/drawingml/2006/main" xmlns:r="http://schemas.openxmlformats.org/officeDocument/2006/relationships" xmlns:p="http://schemas.openxmlformats.org/presentationml/2006/main">
+  <p:cSld>
+    <p:spTree>
+      <p:nvGrpSpPr>
+        <p:cNvPr id="1" name=""/>
+        <p:cNvGrpSpPr/>
+        <p:nvPr/>
+      </p:nvGrpSpPr>
+      <p:grpSpPr>
+        <a:xfrm>
+          <a:off x="0" y="0"/>
+          <a:ext cx="0" cy="0"/>
+          <a:chOff x="0" y="0"/>
+          <a:chExt cx="0" cy="0"/>
+        </a:xfrm>
+      </p:grpSpPr>
+      <p:sp>
+        <p:nvSpPr>
+          <p:cNvPr id="2" name="Title 1"/>
+          <p:cNvSpPr>
+            <a:spLocks noGrp="1"/>
+          </p:cNvSpPr>
+          <p:nvPr>
+            <p:ph type="title"/>
+          </p:nvPr>
+        </p:nvSpPr>
+        <p:spPr/>
+        <p:txBody>
+          <a:bodyPr/>
+          <a:lstStyle/>
+          <a:p>
+            <a:r>
+              <a:rPr lang="en-US" dirty="0" smtClean="0"/>
+              <a:t>An Interpreted Language</a:t>
+            </a:r>
+            <a:endParaRPr lang="en-US" dirty="0"/>
+          </a:p>
+        </p:txBody>
+      </p:sp>
+      <p:sp>
+        <p:nvSpPr>
+          <p:cNvPr id="3" name="Content Placeholder 2"/>
+          <p:cNvSpPr>
+            <a:spLocks noGrp="1"/>
+          </p:cNvSpPr>
+          <p:nvPr>
+            <p:ph idx="1"/>
+          </p:nvPr>
+        </p:nvSpPr>
+        <p:spPr/>
+        <p:txBody>
+          <a:bodyPr/>
+          <a:lstStyle/>
+          <a:p>
+            <a:r>
+              <a:rPr lang="en-US" dirty="0" smtClean="0"/>
+              <a:t>Code is compiled when it is executed</a:t>
+            </a:r>
+          </a:p>
+          <a:p>
+            <a:endParaRPr lang="en-US" dirty="0"/>
+          </a:p>
+          <a:p>
+            <a:r>
+              <a:rPr lang="en-US" dirty="0" smtClean="0"/>
+              <a:t>.</a:t>
+            </a:r>
+            <a:r>
+              <a:rPr lang="en-US" dirty="0" err="1" smtClean="0"/>
+              <a:t>py</a:t>
+            </a:r>
+            <a:r>
+              <a:rPr lang="en-US" dirty="0" smtClean="0"/>
+              <a:t> file – Python code</a:t>
+            </a:r>
+          </a:p>
+          <a:p>
+            <a:endParaRPr lang="en-US" dirty="0"/>
+          </a:p>
+          <a:p>
+            <a:r>
+              <a:rPr lang="en-US" dirty="0" smtClean="0"/>
+              <a:t>.</a:t>
+            </a:r>
+            <a:r>
+              <a:rPr lang="en-US" dirty="0" err="1" smtClean="0"/>
+              <a:t>pyc</a:t>
+            </a:r>
+            <a:r>
+              <a:rPr lang="en-US" dirty="0" smtClean="0"/>
+              <a:t> file – Compiled Python code</a:t>
+            </a:r>
+            <a:endParaRPr lang="en-US" dirty="0"/>
+          </a:p>
+        </p:txBody>
+      </p:sp>
+    </p:spTree>
+    <p:extLst>
+      <p:ext uri="{BB962C8B-B14F-4D97-AF65-F5344CB8AC3E}">
+        <p14:creationId xmlns:p14="http://schemas.microsoft.com/office/powerpoint/2010/main" val="2203058974"/>
+      </p:ext>
+    </p:extLst>
+  </p:cSld>
+  <p:clrMapOvr>
+    <a:masterClrMapping/>
+  </p:clrMapOvr>
+</p:sld>
+</file>
+
+<file path=ppt/slides/slide5.xml><?xml version="1.0" encoding="utf-8"?>
+<p:sld xmlns:a="http://schemas.openxmlformats.org/drawingml/2006/main" xmlns:r="http://schemas.openxmlformats.org/officeDocument/2006/relationships" xmlns:p="http://schemas.openxmlformats.org/presentationml/2006/main">
+  <p:cSld>
+    <p:spTree>
+      <p:nvGrpSpPr>
+        <p:cNvPr id="1" name=""/>
+        <p:cNvGrpSpPr/>
+        <p:nvPr/>
+      </p:nvGrpSpPr>
+      <p:grpSpPr>
+        <a:xfrm>
+          <a:off x="0" y="0"/>
+          <a:ext cx="0" cy="0"/>
+          <a:chOff x="0" y="0"/>
+          <a:chExt cx="0" cy="0"/>
+        </a:xfrm>
+      </p:grpSpPr>
+      <p:sp>
+        <p:nvSpPr>
+          <p:cNvPr id="2" name="Title 1"/>
+          <p:cNvSpPr>
+            <a:spLocks noGrp="1"/>
+          </p:cNvSpPr>
+          <p:nvPr>
+            <p:ph type="title"/>
+          </p:nvPr>
+        </p:nvSpPr>
+        <p:spPr/>
+        <p:txBody>
+          <a:bodyPr/>
+          <a:lstStyle/>
+          <a:p>
+            <a:r>
+              <a:rPr lang="en-US" dirty="0" smtClean="0"/>
+              <a:t>“Built-In” Libraries</a:t>
+            </a:r>
+            <a:endParaRPr lang="en-US" dirty="0"/>
+          </a:p>
+        </p:txBody>
+      </p:sp>
+      <p:sp>
+        <p:nvSpPr>
+          <p:cNvPr id="3" name="Content Placeholder 2"/>
+          <p:cNvSpPr>
+            <a:spLocks noGrp="1"/>
+          </p:cNvSpPr>
+          <p:nvPr>
+            <p:ph idx="1"/>
+          </p:nvPr>
+        </p:nvSpPr>
+        <p:spPr/>
+        <p:txBody>
+          <a:bodyPr/>
+          <a:lstStyle/>
+          <a:p>
+            <a:r>
+              <a:rPr lang="en-US" dirty="0" smtClean="0"/>
+              <a:t>Python come with a lot of great capabilities</a:t>
+            </a:r>
+          </a:p>
+          <a:p>
+            <a:pPr lvl="1"/>
+            <a:r>
+              <a:rPr lang="en-US" dirty="0" smtClean="0"/>
+              <a:t>String </a:t>
+            </a:r>
+            <a:r>
+              <a:rPr lang="en-US" dirty="0" err="1" smtClean="0"/>
+              <a:t>manipuylations</a:t>
+            </a:r>
+            <a:r>
+              <a:rPr lang="en-US" dirty="0" smtClean="0"/>
+              <a:t>, math, http calls, and more</a:t>
+            </a:r>
+          </a:p>
+          <a:p>
+            <a:endParaRPr lang="en-US" dirty="0"/>
+          </a:p>
+          <a:p>
+            <a:r>
+              <a:rPr lang="en-US" dirty="0" smtClean="0"/>
+              <a:t>If it isn’t “built-in”, there is probably an </a:t>
+            </a:r>
+            <a:r>
+              <a:rPr lang="en-US" i="1" dirty="0" smtClean="0"/>
+              <a:t>import</a:t>
+            </a:r>
+          </a:p>
+          <a:p>
+            <a:pPr lvl="1"/>
+            <a:r>
+              <a:rPr lang="en-US" i="1" dirty="0" err="1" smtClean="0">
+                <a:hlinkClick r:id="rId2"/>
+              </a:rPr>
+              <a:t>Numpy</a:t>
+            </a:r>
+            <a:endParaRPr lang="en-US" i="1" dirty="0" smtClean="0"/>
+          </a:p>
+          <a:p>
+            <a:pPr lvl="1"/>
+            <a:r>
+              <a:rPr lang="en-US" i="1" dirty="0" smtClean="0">
+                <a:hlinkClick r:id="rId3"/>
+              </a:rPr>
+              <a:t>Requests</a:t>
+            </a:r>
+            <a:endParaRPr lang="en-US" i="1" dirty="0" smtClean="0"/>
+          </a:p>
+          <a:p>
+            <a:pPr lvl="1"/>
+            <a:r>
+              <a:rPr lang="en-US" i="1" dirty="0" smtClean="0">
+                <a:hlinkClick r:id="rId4"/>
+              </a:rPr>
+              <a:t>Urllib2</a:t>
+            </a:r>
+            <a:endParaRPr lang="en-US" i="1" dirty="0" smtClean="0"/>
+          </a:p>
+          <a:p>
+            <a:pPr lvl="1"/>
+            <a:r>
+              <a:rPr lang="en-US" i="1" dirty="0" err="1" smtClean="0">
+                <a:hlinkClick r:id="rId5"/>
+              </a:rPr>
+              <a:t>scipy</a:t>
+            </a:r>
+            <a:endParaRPr lang="en-US" i="1" dirty="0"/>
+          </a:p>
+          <a:p>
+            <a:endParaRPr lang="en-US" dirty="0"/>
+          </a:p>
+        </p:txBody>
+      </p:sp>
+    </p:spTree>
+    <p:extLst>
+      <p:ext uri="{BB962C8B-B14F-4D97-AF65-F5344CB8AC3E}">
+        <p14:creationId xmlns:p14="http://schemas.microsoft.com/office/powerpoint/2010/main" val="3150390547"/>
+      </p:ext>
+    </p:extLst>
+  </p:cSld>
+  <p:clrMapOvr>
+    <a:masterClrMapping/>
+  </p:clrMapOvr>
+</p:sld>
+</file>
+
+<file path=ppt/slides/slide6.xml><?xml version="1.0" encoding="utf-8"?>
+<p:sld xmlns:a="http://schemas.openxmlformats.org/drawingml/2006/main" xmlns:r="http://schemas.openxmlformats.org/officeDocument/2006/relationships" xmlns:p="http://schemas.openxmlformats.org/presentationml/2006/main">
+  <p:cSld>
+    <p:spTree>
+      <p:nvGrpSpPr>
+        <p:cNvPr id="1" name=""/>
+        <p:cNvGrpSpPr/>
+        <p:nvPr/>
+      </p:nvGrpSpPr>
+      <p:grpSpPr>
+        <a:xfrm>
+          <a:off x="0" y="0"/>
+          <a:ext cx="0" cy="0"/>
+          <a:chOff x="0" y="0"/>
+          <a:chExt cx="0" cy="0"/>
+        </a:xfrm>
+      </p:grpSpPr>
+      <p:sp>
+        <p:nvSpPr>
+          <p:cNvPr id="2" name="Title 1"/>
+          <p:cNvSpPr>
+            <a:spLocks noGrp="1"/>
+          </p:cNvSpPr>
+          <p:nvPr>
+            <p:ph type="title"/>
+          </p:nvPr>
+        </p:nvSpPr>
+        <p:spPr/>
+        <p:txBody>
+          <a:bodyPr/>
+          <a:lstStyle/>
+          <a:p>
+            <a:r>
+              <a:rPr lang="en-US" dirty="0" smtClean="0"/>
+              <a:t>A “Glue” Language</a:t>
+            </a:r>
+            <a:endParaRPr lang="en-US" dirty="0"/>
+          </a:p>
+        </p:txBody>
+      </p:sp>
+      <p:sp>
+        <p:nvSpPr>
+          <p:cNvPr id="3" name="Content Placeholder 2"/>
+          <p:cNvSpPr>
+            <a:spLocks noGrp="1"/>
+          </p:cNvSpPr>
+          <p:nvPr>
+            <p:ph idx="1"/>
+          </p:nvPr>
+        </p:nvSpPr>
+        <p:spPr/>
+        <p:txBody>
+          <a:bodyPr/>
+          <a:lstStyle/>
+          <a:p>
+            <a:r>
+              <a:rPr lang="en-US" dirty="0" smtClean="0"/>
+              <a:t>Using Python to control other languages</a:t>
+            </a:r>
+          </a:p>
+          <a:p>
+            <a:endParaRPr lang="en-US" dirty="0"/>
+          </a:p>
+          <a:p>
+            <a:r>
+              <a:rPr lang="en-US" dirty="0" smtClean="0"/>
+              <a:t>Great at allowing programmers to quickly pull together a lot of </a:t>
+            </a:r>
+            <a:r>
+              <a:rPr lang="en-US" dirty="0" err="1" smtClean="0"/>
+              <a:t>apabilities</a:t>
+            </a:r>
+            <a:endParaRPr lang="en-US" dirty="0" smtClean="0"/>
+          </a:p>
+          <a:p>
+            <a:endParaRPr lang="en-US" dirty="0"/>
+          </a:p>
+          <a:p>
+            <a:r>
+              <a:rPr lang="en-US" dirty="0" smtClean="0"/>
+              <a:t>In reality, Python is more than a “glue” language. </a:t>
+            </a:r>
+          </a:p>
+          <a:p>
+            <a:pPr lvl="1"/>
+            <a:r>
+              <a:rPr lang="en-US" dirty="0" smtClean="0"/>
+              <a:t>Python is behind the scenes in websites, </a:t>
+            </a:r>
+            <a:r>
+              <a:rPr lang="en-US" dirty="0" err="1" smtClean="0"/>
+              <a:t>geoprocessing</a:t>
+            </a:r>
+            <a:r>
+              <a:rPr lang="en-US" dirty="0" smtClean="0"/>
+              <a:t> tools, and much more</a:t>
+            </a:r>
+          </a:p>
+          <a:p>
+            <a:endParaRPr lang="en-US" dirty="0"/>
+          </a:p>
+          <a:p>
+            <a:endParaRPr lang="en-US" dirty="0"/>
+          </a:p>
+        </p:txBody>
+      </p:sp>
+    </p:spTree>
+    <p:extLst>
+      <p:ext uri="{BB962C8B-B14F-4D97-AF65-F5344CB8AC3E}">
+        <p14:creationId xmlns:p14="http://schemas.microsoft.com/office/powerpoint/2010/main" val="4177840161"/>
+      </p:ext>
+    </p:extLst>
+  </p:cSld>
+  <p:clrMapOvr>
+    <a:masterClrMapping/>
+  </p:clrMapOvr>
+</p:sld>
+</file>
+
+<file path=ppt/slides/slide7.xml><?xml version="1.0" encoding="utf-8"?>
+<p:sld xmlns:a="http://schemas.openxmlformats.org/drawingml/2006/main" xmlns:r="http://schemas.openxmlformats.org/officeDocument/2006/relationships" xmlns:p="http://schemas.openxmlformats.org/presentationml/2006/main">
+  <p:cSld>
+    <p:spTree>
+      <p:nvGrpSpPr>
+        <p:cNvPr id="1" name=""/>
+        <p:cNvGrpSpPr/>
+        <p:nvPr/>
+      </p:nvGrpSpPr>
+      <p:grpSpPr>
+        <a:xfrm>
+          <a:off x="0" y="0"/>
+          <a:ext cx="0" cy="0"/>
+          <a:chOff x="0" y="0"/>
+          <a:chExt cx="0" cy="0"/>
+        </a:xfrm>
+      </p:grpSpPr>
+      <p:sp>
+        <p:nvSpPr>
+          <p:cNvPr id="2" name="Title 1"/>
+          <p:cNvSpPr>
+            <a:spLocks noGrp="1"/>
+          </p:cNvSpPr>
+          <p:nvPr>
+            <p:ph type="title"/>
+          </p:nvPr>
+        </p:nvSpPr>
+        <p:spPr/>
+        <p:txBody>
+          <a:bodyPr/>
+          <a:lstStyle/>
+          <a:p>
+            <a:r>
+              <a:rPr lang="en-US" dirty="0" smtClean="0"/>
               <a:t>IDE – Integrated Development Environment</a:t>
             </a:r>
             <a:endParaRPr lang="en-US" dirty="0"/>
@@ -3258,7 +4365,7 @@
 </p:sld>
 </file>
 
-<file path=ppt/slides/slide3.xml><?xml version="1.0" encoding="utf-8"?>
+<file path=ppt/slides/slide8.xml><?xml version="1.0" encoding="utf-8"?>
 <p:sld xmlns:a="http://schemas.openxmlformats.org/drawingml/2006/main" xmlns:r="http://schemas.openxmlformats.org/officeDocument/2006/relationships" xmlns:p="http://schemas.openxmlformats.org/presentationml/2006/main">
   <p:cSld>
     <p:spTree>
@@ -3371,7 +4478,7 @@
 </p:sld>
 </file>
 
-<file path=ppt/slides/slide4.xml><?xml version="1.0" encoding="utf-8"?>
+<file path=ppt/slides/slide9.xml><?xml version="1.0" encoding="utf-8"?>
 <p:sld xmlns:a="http://schemas.openxmlformats.org/drawingml/2006/main" xmlns:r="http://schemas.openxmlformats.org/officeDocument/2006/relationships" xmlns:p="http://schemas.openxmlformats.org/presentationml/2006/main">
   <p:cSld>
     <p:spTree>
@@ -3431,12 +4538,12 @@
               <a:t>More </a:t>
             </a:r>
             <a:r>
-              <a:rPr lang="en-US" dirty="0" err="1" smtClean="0"/>
-              <a:t>poular</a:t>
-            </a:r>
-            <a:r>
               <a:rPr lang="en-US" dirty="0" smtClean="0"/>
-              <a:t> than IDL</a:t>
+              <a:t>popular </a:t>
+            </a:r>
+            <a:r>
+              <a:rPr lang="en-US" dirty="0" smtClean="0"/>
+              <a:t>than IDL</a:t>
             </a:r>
           </a:p>
           <a:p>
@@ -3521,465 +4628,6 @@
     <p:extLst>
       <p:ext uri="{BB962C8B-B14F-4D97-AF65-F5344CB8AC3E}">
         <p14:creationId xmlns:p14="http://schemas.microsoft.com/office/powerpoint/2010/main" val="3520580628"/>
-      </p:ext>
-    </p:extLst>
-  </p:cSld>
-  <p:clrMapOvr>
-    <a:masterClrMapping/>
-  </p:clrMapOvr>
-</p:sld>
-</file>
-
-<file path=ppt/slides/slide5.xml><?xml version="1.0" encoding="utf-8"?>
-<p:sld xmlns:a="http://schemas.openxmlformats.org/drawingml/2006/main" xmlns:r="http://schemas.openxmlformats.org/officeDocument/2006/relationships" xmlns:p="http://schemas.openxmlformats.org/presentationml/2006/main">
-  <p:cSld>
-    <p:spTree>
-      <p:nvGrpSpPr>
-        <p:cNvPr id="1" name=""/>
-        <p:cNvGrpSpPr/>
-        <p:nvPr/>
-      </p:nvGrpSpPr>
-      <p:grpSpPr>
-        <a:xfrm>
-          <a:off x="0" y="0"/>
-          <a:ext cx="0" cy="0"/>
-          <a:chOff x="0" y="0"/>
-          <a:chExt cx="0" cy="0"/>
-        </a:xfrm>
-      </p:grpSpPr>
-      <p:sp>
-        <p:nvSpPr>
-          <p:cNvPr id="2" name="Title 1"/>
-          <p:cNvSpPr>
-            <a:spLocks noGrp="1"/>
-          </p:cNvSpPr>
-          <p:nvPr>
-            <p:ph type="title"/>
-          </p:nvPr>
-        </p:nvSpPr>
-        <p:spPr/>
-        <p:txBody>
-          <a:bodyPr/>
-          <a:lstStyle/>
-          <a:p>
-            <a:r>
-              <a:rPr lang="en-US" dirty="0" smtClean="0"/>
-              <a:t>Others</a:t>
-            </a:r>
-            <a:endParaRPr lang="en-US" dirty="0"/>
-          </a:p>
-        </p:txBody>
-      </p:sp>
-      <p:sp>
-        <p:nvSpPr>
-          <p:cNvPr id="3" name="Content Placeholder 2"/>
-          <p:cNvSpPr>
-            <a:spLocks noGrp="1"/>
-          </p:cNvSpPr>
-          <p:nvPr>
-            <p:ph idx="1"/>
-          </p:nvPr>
-        </p:nvSpPr>
-        <p:spPr/>
-        <p:txBody>
-          <a:bodyPr/>
-          <a:lstStyle/>
-          <a:p>
-            <a:r>
-              <a:rPr lang="en-US" dirty="0" err="1" smtClean="0"/>
-              <a:t>PyCharm</a:t>
-            </a:r>
-            <a:endParaRPr lang="en-US" dirty="0" smtClean="0"/>
-          </a:p>
-          <a:p>
-            <a:r>
-              <a:rPr lang="en-US" dirty="0" smtClean="0"/>
-              <a:t>Eclipse</a:t>
-            </a:r>
-          </a:p>
-          <a:p>
-            <a:r>
-              <a:rPr lang="en-US" dirty="0" smtClean="0"/>
-              <a:t>Visual Studio</a:t>
-            </a:r>
-          </a:p>
-          <a:p>
-            <a:r>
-              <a:rPr lang="en-US" dirty="0" smtClean="0"/>
-              <a:t>Wing IDE</a:t>
-            </a:r>
-          </a:p>
-          <a:p>
-            <a:r>
-              <a:rPr lang="en-US" dirty="0" err="1" smtClean="0"/>
-              <a:t>Spyder</a:t>
-            </a:r>
-            <a:endParaRPr lang="en-US" dirty="0" smtClean="0"/>
-          </a:p>
-          <a:p>
-            <a:r>
-              <a:rPr lang="en-US" dirty="0" smtClean="0"/>
-              <a:t>Top 10 Python IDEs: </a:t>
-            </a:r>
-            <a:r>
-              <a:rPr lang="en-US" dirty="0" smtClean="0">
-                <a:hlinkClick r:id="rId2"/>
-              </a:rPr>
-              <a:t>http://noeticforce.com/best-python-ide-for-programmers-windows-and-mac</a:t>
-            </a:r>
-            <a:endParaRPr lang="en-US" dirty="0" smtClean="0"/>
-          </a:p>
-          <a:p>
-            <a:endParaRPr lang="en-US" dirty="0" smtClean="0"/>
-          </a:p>
-          <a:p>
-            <a:endParaRPr lang="en-US" dirty="0"/>
-          </a:p>
-        </p:txBody>
-      </p:sp>
-    </p:spTree>
-    <p:extLst>
-      <p:ext uri="{BB962C8B-B14F-4D97-AF65-F5344CB8AC3E}">
-        <p14:creationId xmlns:p14="http://schemas.microsoft.com/office/powerpoint/2010/main" val="3113246402"/>
-      </p:ext>
-    </p:extLst>
-  </p:cSld>
-  <p:clrMapOvr>
-    <a:masterClrMapping/>
-  </p:clrMapOvr>
-</p:sld>
-</file>
-
-<file path=ppt/slides/slide6.xml><?xml version="1.0" encoding="utf-8"?>
-<p:sld xmlns:a="http://schemas.openxmlformats.org/drawingml/2006/main" xmlns:r="http://schemas.openxmlformats.org/officeDocument/2006/relationships" xmlns:p="http://schemas.openxmlformats.org/presentationml/2006/main">
-  <p:cSld>
-    <p:spTree>
-      <p:nvGrpSpPr>
-        <p:cNvPr id="1" name=""/>
-        <p:cNvGrpSpPr/>
-        <p:nvPr/>
-      </p:nvGrpSpPr>
-      <p:grpSpPr>
-        <a:xfrm>
-          <a:off x="0" y="0"/>
-          <a:ext cx="0" cy="0"/>
-          <a:chOff x="0" y="0"/>
-          <a:chExt cx="0" cy="0"/>
-        </a:xfrm>
-      </p:grpSpPr>
-      <p:sp>
-        <p:nvSpPr>
-          <p:cNvPr id="4" name="Title 3"/>
-          <p:cNvSpPr>
-            <a:spLocks noGrp="1"/>
-          </p:cNvSpPr>
-          <p:nvPr>
-            <p:ph type="title"/>
-          </p:nvPr>
-        </p:nvSpPr>
-        <p:spPr/>
-        <p:txBody>
-          <a:bodyPr/>
-          <a:lstStyle/>
-          <a:p>
-            <a:r>
-              <a:rPr lang="en-US" dirty="0" smtClean="0"/>
-              <a:t>Getting Help</a:t>
-            </a:r>
-            <a:endParaRPr lang="en-US" dirty="0"/>
-          </a:p>
-        </p:txBody>
-      </p:sp>
-      <p:sp>
-        <p:nvSpPr>
-          <p:cNvPr id="5" name="Text Placeholder 4"/>
-          <p:cNvSpPr>
-            <a:spLocks noGrp="1"/>
-          </p:cNvSpPr>
-          <p:nvPr>
-            <p:ph type="body" idx="1"/>
-          </p:nvPr>
-        </p:nvSpPr>
-        <p:spPr/>
-        <p:txBody>
-          <a:bodyPr/>
-          <a:lstStyle/>
-          <a:p>
-            <a:endParaRPr lang="en-US"/>
-          </a:p>
-        </p:txBody>
-      </p:sp>
-    </p:spTree>
-    <p:extLst>
-      <p:ext uri="{BB962C8B-B14F-4D97-AF65-F5344CB8AC3E}">
-        <p14:creationId xmlns:p14="http://schemas.microsoft.com/office/powerpoint/2010/main" val="4216389736"/>
-      </p:ext>
-    </p:extLst>
-  </p:cSld>
-  <p:clrMapOvr>
-    <a:masterClrMapping/>
-  </p:clrMapOvr>
-</p:sld>
-</file>
-
-<file path=ppt/slides/slide7.xml><?xml version="1.0" encoding="utf-8"?>
-<p:sld xmlns:a="http://schemas.openxmlformats.org/drawingml/2006/main" xmlns:r="http://schemas.openxmlformats.org/officeDocument/2006/relationships" xmlns:p="http://schemas.openxmlformats.org/presentationml/2006/main">
-  <p:cSld>
-    <p:spTree>
-      <p:nvGrpSpPr>
-        <p:cNvPr id="1" name=""/>
-        <p:cNvGrpSpPr/>
-        <p:nvPr/>
-      </p:nvGrpSpPr>
-      <p:grpSpPr>
-        <a:xfrm>
-          <a:off x="0" y="0"/>
-          <a:ext cx="0" cy="0"/>
-          <a:chOff x="0" y="0"/>
-          <a:chExt cx="0" cy="0"/>
-        </a:xfrm>
-      </p:grpSpPr>
-      <p:sp>
-        <p:nvSpPr>
-          <p:cNvPr id="4" name="Title 3"/>
-          <p:cNvSpPr>
-            <a:spLocks noGrp="1"/>
-          </p:cNvSpPr>
-          <p:nvPr>
-            <p:ph type="title"/>
-          </p:nvPr>
-        </p:nvSpPr>
-        <p:spPr/>
-        <p:txBody>
-          <a:bodyPr/>
-          <a:lstStyle/>
-          <a:p>
-            <a:r>
-              <a:rPr lang="en-US" dirty="0" smtClean="0"/>
-              <a:t>Arcgis.com</a:t>
-            </a:r>
-            <a:endParaRPr lang="en-US" dirty="0"/>
-          </a:p>
-        </p:txBody>
-      </p:sp>
-      <p:pic>
-        <p:nvPicPr>
-          <p:cNvPr id="6" name="Picture 5"/>
-          <p:cNvPicPr>
-            <a:picLocks noChangeAspect="1"/>
-          </p:cNvPicPr>
-          <p:nvPr/>
-        </p:nvPicPr>
-        <p:blipFill rotWithShape="1">
-          <a:blip r:embed="rId2"/>
-          <a:srcRect t="3165"/>
-          <a:stretch/>
-        </p:blipFill>
-        <p:spPr>
-          <a:xfrm>
-            <a:off x="1578057" y="1404258"/>
-            <a:ext cx="9559908" cy="5207288"/>
-          </a:xfrm>
-          <a:prstGeom prst="rect">
-            <a:avLst/>
-          </a:prstGeom>
-        </p:spPr>
-      </p:pic>
-    </p:spTree>
-    <p:extLst>
-      <p:ext uri="{BB962C8B-B14F-4D97-AF65-F5344CB8AC3E}">
-        <p14:creationId xmlns:p14="http://schemas.microsoft.com/office/powerpoint/2010/main" val="3140651273"/>
-      </p:ext>
-    </p:extLst>
-  </p:cSld>
-  <p:clrMapOvr>
-    <a:masterClrMapping/>
-  </p:clrMapOvr>
-</p:sld>
-</file>
-
-<file path=ppt/slides/slide8.xml><?xml version="1.0" encoding="utf-8"?>
-<p:sld xmlns:a="http://schemas.openxmlformats.org/drawingml/2006/main" xmlns:r="http://schemas.openxmlformats.org/officeDocument/2006/relationships" xmlns:p="http://schemas.openxmlformats.org/presentationml/2006/main">
-  <p:cSld>
-    <p:spTree>
-      <p:nvGrpSpPr>
-        <p:cNvPr id="1" name=""/>
-        <p:cNvGrpSpPr/>
-        <p:nvPr/>
-      </p:nvGrpSpPr>
-      <p:grpSpPr>
-        <a:xfrm>
-          <a:off x="0" y="0"/>
-          <a:ext cx="0" cy="0"/>
-          <a:chOff x="0" y="0"/>
-          <a:chExt cx="0" cy="0"/>
-        </a:xfrm>
-      </p:grpSpPr>
-      <p:sp>
-        <p:nvSpPr>
-          <p:cNvPr id="2" name="Title 1"/>
-          <p:cNvSpPr>
-            <a:spLocks noGrp="1"/>
-          </p:cNvSpPr>
-          <p:nvPr>
-            <p:ph type="title"/>
-          </p:nvPr>
-        </p:nvSpPr>
-        <p:spPr/>
-        <p:txBody>
-          <a:bodyPr/>
-          <a:lstStyle/>
-          <a:p>
-            <a:r>
-              <a:rPr lang="en-US" dirty="0" smtClean="0"/>
-              <a:t>Google!</a:t>
-            </a:r>
-            <a:endParaRPr lang="en-US" dirty="0"/>
-          </a:p>
-        </p:txBody>
-      </p:sp>
-      <p:sp>
-        <p:nvSpPr>
-          <p:cNvPr id="4" name="Content Placeholder 3"/>
-          <p:cNvSpPr>
-            <a:spLocks noGrp="1"/>
-          </p:cNvSpPr>
-          <p:nvPr>
-            <p:ph idx="1"/>
-          </p:nvPr>
-        </p:nvSpPr>
-        <p:spPr>
-          <a:xfrm>
-            <a:off x="987829" y="1393363"/>
-            <a:ext cx="10515600" cy="4351338"/>
-          </a:xfrm>
-        </p:spPr>
-        <p:txBody>
-          <a:bodyPr/>
-          <a:lstStyle/>
-          <a:p>
-            <a:r>
-              <a:rPr lang="en-US" dirty="0" smtClean="0"/>
-              <a:t>For example, </a:t>
-            </a:r>
-            <a:r>
-              <a:rPr lang="en-US" dirty="0" smtClean="0">
-                <a:hlinkClick r:id="rId2"/>
-              </a:rPr>
-              <a:t>Google</a:t>
-            </a:r>
-            <a:r>
-              <a:rPr lang="en-US" dirty="0" smtClean="0"/>
-              <a:t> “Python dictionary”</a:t>
-            </a:r>
-            <a:endParaRPr lang="en-US" dirty="0"/>
-          </a:p>
-        </p:txBody>
-      </p:sp>
-      <p:pic>
-        <p:nvPicPr>
-          <p:cNvPr id="5" name="Picture 4"/>
-          <p:cNvPicPr>
-            <a:picLocks noChangeAspect="1"/>
-          </p:cNvPicPr>
-          <p:nvPr/>
-        </p:nvPicPr>
-        <p:blipFill rotWithShape="1">
-          <a:blip r:embed="rId3"/>
-          <a:srcRect t="3059" r="47489"/>
-          <a:stretch/>
-        </p:blipFill>
-        <p:spPr>
-          <a:xfrm>
-            <a:off x="3365269" y="1986742"/>
-            <a:ext cx="5461461" cy="5671358"/>
-          </a:xfrm>
-          <a:prstGeom prst="rect">
-            <a:avLst/>
-          </a:prstGeom>
-        </p:spPr>
-      </p:pic>
-    </p:spTree>
-    <p:extLst>
-      <p:ext uri="{BB962C8B-B14F-4D97-AF65-F5344CB8AC3E}">
-        <p14:creationId xmlns:p14="http://schemas.microsoft.com/office/powerpoint/2010/main" val="547555302"/>
-      </p:ext>
-    </p:extLst>
-  </p:cSld>
-  <p:clrMapOvr>
-    <a:masterClrMapping/>
-  </p:clrMapOvr>
-</p:sld>
-</file>
-
-<file path=ppt/slides/slide9.xml><?xml version="1.0" encoding="utf-8"?>
-<p:sld xmlns:a="http://schemas.openxmlformats.org/drawingml/2006/main" xmlns:r="http://schemas.openxmlformats.org/officeDocument/2006/relationships" xmlns:p="http://schemas.openxmlformats.org/presentationml/2006/main">
-  <p:cSld>
-    <p:spTree>
-      <p:nvGrpSpPr>
-        <p:cNvPr id="1" name=""/>
-        <p:cNvGrpSpPr/>
-        <p:nvPr/>
-      </p:nvGrpSpPr>
-      <p:grpSpPr>
-        <a:xfrm>
-          <a:off x="0" y="0"/>
-          <a:ext cx="0" cy="0"/>
-          <a:chOff x="0" y="0"/>
-          <a:chExt cx="0" cy="0"/>
-        </a:xfrm>
-      </p:grpSpPr>
-      <p:sp>
-        <p:nvSpPr>
-          <p:cNvPr id="2" name="Title 1"/>
-          <p:cNvSpPr>
-            <a:spLocks noGrp="1"/>
-          </p:cNvSpPr>
-          <p:nvPr>
-            <p:ph type="title"/>
-          </p:nvPr>
-        </p:nvSpPr>
-        <p:spPr/>
-        <p:txBody>
-          <a:bodyPr/>
-          <a:lstStyle/>
-          <a:p>
-            <a:r>
-              <a:rPr lang="en-US" dirty="0" smtClean="0"/>
-              <a:t>Stack Overflow</a:t>
-            </a:r>
-            <a:endParaRPr lang="en-US" dirty="0"/>
-          </a:p>
-        </p:txBody>
-      </p:sp>
-      <p:pic>
-        <p:nvPicPr>
-          <p:cNvPr id="4" name="Picture 3"/>
-          <p:cNvPicPr>
-            <a:picLocks noChangeAspect="1"/>
-          </p:cNvPicPr>
-          <p:nvPr/>
-        </p:nvPicPr>
-        <p:blipFill>
-          <a:blip r:embed="rId2"/>
-          <a:stretch>
-            <a:fillRect/>
-          </a:stretch>
-        </p:blipFill>
-        <p:spPr>
-          <a:xfrm>
-            <a:off x="1923748" y="1543050"/>
-            <a:ext cx="8670179" cy="4876976"/>
-          </a:xfrm>
-          <a:prstGeom prst="rect">
-            <a:avLst/>
-          </a:prstGeom>
-        </p:spPr>
-      </p:pic>
-    </p:spTree>
-    <p:extLst>
-      <p:ext uri="{BB962C8B-B14F-4D97-AF65-F5344CB8AC3E}">
-        <p14:creationId xmlns:p14="http://schemas.microsoft.com/office/powerpoint/2010/main" val="2081193750"/>
       </p:ext>
     </p:extLst>
   </p:cSld>

</xml_diff>